<commit_message>
Added names, logo, and tech stack to presentation
</commit_message>
<xml_diff>
--- a/CS 340 Final Presentation.pptx
+++ b/CS 340 Final Presentation.pptx
@@ -6,16 +6,17 @@
   </p:sldMasterIdLst>
   <p:sldIdLst>
     <p:sldId id="256" r:id="rId2"/>
-    <p:sldId id="269" r:id="rId3"/>
-    <p:sldId id="261" r:id="rId4"/>
-    <p:sldId id="262" r:id="rId5"/>
-    <p:sldId id="268" r:id="rId6"/>
-    <p:sldId id="267" r:id="rId7"/>
-    <p:sldId id="266" r:id="rId8"/>
-    <p:sldId id="259" r:id="rId9"/>
-    <p:sldId id="260" r:id="rId10"/>
-    <p:sldId id="263" r:id="rId11"/>
-    <p:sldId id="264" r:id="rId12"/>
+    <p:sldId id="270" r:id="rId3"/>
+    <p:sldId id="269" r:id="rId4"/>
+    <p:sldId id="261" r:id="rId5"/>
+    <p:sldId id="262" r:id="rId6"/>
+    <p:sldId id="268" r:id="rId7"/>
+    <p:sldId id="267" r:id="rId8"/>
+    <p:sldId id="266" r:id="rId9"/>
+    <p:sldId id="259" r:id="rId10"/>
+    <p:sldId id="260" r:id="rId11"/>
+    <p:sldId id="263" r:id="rId12"/>
+    <p:sldId id="264" r:id="rId13"/>
   </p:sldIdLst>
   <p:sldSz cx="12192000" cy="6858000"/>
   <p:notesSz cx="6858000" cy="9144000"/>
@@ -125,6 +126,7 @@
 <file path=ppt/revisionInfo.xml><?xml version="1.0" encoding="utf-8"?>
 <p1510:revInfo xmlns:a="http://schemas.openxmlformats.org/drawingml/2006/main" xmlns:r="http://schemas.openxmlformats.org/officeDocument/2006/relationships" xmlns:p1510="http://schemas.microsoft.com/office/powerpoint/2015/10/main">
   <p1510:revLst>
+    <p1510:client id="{22137186-4009-46F9-94B1-2982B2D374F0}" v="155" dt="2022-12-04T22:00:15.718"/>
     <p1510:client id="{3A231971-F22B-A227-E760-07C702025AB6}" v="218" dt="2022-11-21T03:25:25.097"/>
     <p1510:client id="{3F55E856-6AE5-9135-B9CF-3EEB55887DDB}" v="299" dt="2022-11-21T04:35:11.361"/>
     <p1510:client id="{72DA75AB-9082-8CE8-96BF-D347835E1B5A}" v="749" dt="2022-11-22T04:08:23.031"/>
@@ -228,7 +230,7 @@
           <a:effectLst/>
           <a:extLst>
             <a:ext uri="{91240B29-F687-4f45-9708-019B960494DF}">
-              <a14:hiddenLine xmlns:a14="http://schemas.microsoft.com/office/drawing/2010/main" xmlns="" w="9525">
+              <a14:hiddenLine xmlns="" xmlns:a14="http://schemas.microsoft.com/office/drawing/2010/main" w="9525">
                 <a:solidFill>
                   <a:srgbClr val="000000"/>
                 </a:solidFill>
@@ -419,7 +421,7 @@
             <a:fld id="{08B9EBBA-996F-894A-B54A-D6246ED52CEA}" type="datetimeFigureOut">
               <a:rPr lang="en-US" dirty="0"/>
               <a:pPr/>
-              <a:t>12/1/2022</a:t>
+              <a:t>12/4/22</a:t>
             </a:fld>
             <a:endParaRPr lang="en-US"/>
           </a:p>
@@ -734,7 +736,7 @@
             <a:fld id="{18C79C5D-2A6F-F04D-97DA-BEF2467B64E4}" type="datetimeFigureOut">
               <a:rPr lang="en-US" dirty="0"/>
               <a:pPr/>
-              <a:t>12/1/2022</a:t>
+              <a:t>12/4/22</a:t>
             </a:fld>
             <a:endParaRPr lang="en-US"/>
           </a:p>
@@ -1223,7 +1225,7 @@
             <a:fld id="{8DFA1846-DA80-1C48-A609-854EA85C59AD}" type="datetimeFigureOut">
               <a:rPr lang="en-US" dirty="0"/>
               <a:pPr/>
-              <a:t>12/1/2022</a:t>
+              <a:t>12/4/22</a:t>
             </a:fld>
             <a:endParaRPr lang="en-US"/>
           </a:p>
@@ -1593,7 +1595,7 @@
             <a:fld id="{FBF54567-0DE4-3F47-BF90-CB84690072F9}" type="datetimeFigureOut">
               <a:rPr lang="en-US" dirty="0"/>
               <a:pPr/>
-              <a:t>12/1/2022</a:t>
+              <a:t>12/4/22</a:t>
             </a:fld>
             <a:endParaRPr lang="en-US"/>
           </a:p>
@@ -1749,7 +1751,7 @@
           <a:ln/>
           <a:extLst>
             <a:ext uri="{91240B29-F687-4f45-9708-019B960494DF}">
-              <a14:hiddenLine xmlns:a14="http://schemas.microsoft.com/office/drawing/2010/main" xmlns="" w="9525">
+              <a14:hiddenLine xmlns="" xmlns:a14="http://schemas.microsoft.com/office/drawing/2010/main" w="9525">
                 <a:solidFill>
                   <a:srgbClr val="000000"/>
                 </a:solidFill>
@@ -1866,7 +1868,7 @@
             <a:fld id="{C6C52C72-DE31-F449-A4ED-4C594FD91407}" type="datetimeFigureOut">
               <a:rPr lang="en-US" dirty="0"/>
               <a:pPr/>
-              <a:t>12/1/2022</a:t>
+              <a:t>12/4/22</a:t>
             </a:fld>
             <a:endParaRPr lang="en-US"/>
           </a:p>
@@ -2024,7 +2026,7 @@
           <a:ln/>
           <a:extLst>
             <a:ext uri="{91240B29-F687-4f45-9708-019B960494DF}">
-              <a14:hiddenLine xmlns:a14="http://schemas.microsoft.com/office/drawing/2010/main" xmlns="" w="9525">
+              <a14:hiddenLine xmlns="" xmlns:a14="http://schemas.microsoft.com/office/drawing/2010/main" w="9525">
                 <a:solidFill>
                   <a:srgbClr val="000000"/>
                 </a:solidFill>
@@ -2151,7 +2153,7 @@
             <a:fld id="{ED62726E-379B-B349-9EED-81ED093FA806}" type="datetimeFigureOut">
               <a:rPr lang="en-US" dirty="0"/>
               <a:pPr/>
-              <a:t>12/1/2022</a:t>
+              <a:t>12/4/22</a:t>
             </a:fld>
             <a:endParaRPr lang="en-US"/>
           </a:p>
@@ -2307,7 +2309,7 @@
           <a:ln/>
           <a:extLst>
             <a:ext uri="{91240B29-F687-4f45-9708-019B960494DF}">
-              <a14:hiddenLine xmlns:a14="http://schemas.microsoft.com/office/drawing/2010/main" xmlns="" w="9525">
+              <a14:hiddenLine xmlns="" xmlns:a14="http://schemas.microsoft.com/office/drawing/2010/main" w="9525">
                 <a:solidFill>
                   <a:srgbClr val="000000"/>
                 </a:solidFill>
@@ -2434,7 +2436,7 @@
             <a:fld id="{9B3A1323-8D79-1946-B0D7-40001CF92E9D}" type="datetimeFigureOut">
               <a:rPr lang="en-US" dirty="0"/>
               <a:pPr/>
-              <a:t>12/1/2022</a:t>
+              <a:t>12/4/22</a:t>
             </a:fld>
             <a:endParaRPr lang="en-US"/>
           </a:p>
@@ -2778,7 +2780,7 @@
             <a:fld id="{8DFA1846-DA80-1C48-A609-854EA85C59AD}" type="datetimeFigureOut">
               <a:rPr lang="en-US" dirty="0"/>
               <a:pPr/>
-              <a:t>12/1/2022</a:t>
+              <a:t>12/4/22</a:t>
             </a:fld>
             <a:endParaRPr lang="en-US"/>
           </a:p>
@@ -2934,7 +2936,7 @@
           <a:ln/>
           <a:extLst>
             <a:ext uri="{91240B29-F687-4f45-9708-019B960494DF}">
-              <a14:hiddenLine xmlns:a14="http://schemas.microsoft.com/office/drawing/2010/main" xmlns="" w="9525">
+              <a14:hiddenLine xmlns="" xmlns:a14="http://schemas.microsoft.com/office/drawing/2010/main" w="9525">
                 <a:solidFill>
                   <a:srgbClr val="000000"/>
                 </a:solidFill>
@@ -3116,7 +3118,7 @@
             <a:fld id="{57302355-E14B-8545-A8F8-0FE83CC9D524}" type="datetimeFigureOut">
               <a:rPr lang="en-US" dirty="0"/>
               <a:pPr/>
-              <a:t>12/1/2022</a:t>
+              <a:t>12/4/22</a:t>
             </a:fld>
             <a:endParaRPr lang="en-US"/>
           </a:p>
@@ -3272,7 +3274,7 @@
           <a:ln/>
           <a:extLst>
             <a:ext uri="{91240B29-F687-4f45-9708-019B960494DF}">
-              <a14:hiddenLine xmlns:a14="http://schemas.microsoft.com/office/drawing/2010/main" xmlns="" w="9525">
+              <a14:hiddenLine xmlns="" xmlns:a14="http://schemas.microsoft.com/office/drawing/2010/main" w="9525">
                 <a:solidFill>
                   <a:srgbClr val="000000"/>
                 </a:solidFill>
@@ -3592,7 +3594,7 @@
             <a:fld id="{02640F58-564D-2B4F-AE67-E407BA4FCF45}" type="datetimeFigureOut">
               <a:rPr lang="en-US" dirty="0"/>
               <a:pPr/>
-              <a:t>12/1/2022</a:t>
+              <a:t>12/4/22</a:t>
             </a:fld>
             <a:endParaRPr lang="en-US"/>
           </a:p>
@@ -3748,7 +3750,7 @@
           <a:ln/>
           <a:extLst>
             <a:ext uri="{91240B29-F687-4f45-9708-019B960494DF}">
-              <a14:hiddenLine xmlns:a14="http://schemas.microsoft.com/office/drawing/2010/main" xmlns="" w="9525">
+              <a14:hiddenLine xmlns="" xmlns:a14="http://schemas.microsoft.com/office/drawing/2010/main" w="9525">
                 <a:solidFill>
                   <a:srgbClr val="000000"/>
                 </a:solidFill>
@@ -3814,7 +3816,7 @@
             <a:fld id="{F13A34C8-038E-2045-AF43-DF7DBB8E0E9E}" type="datetimeFigureOut">
               <a:rPr lang="en-US" dirty="0"/>
               <a:pPr/>
-              <a:t>12/1/2022</a:t>
+              <a:t>12/4/22</a:t>
             </a:fld>
             <a:endParaRPr lang="en-US"/>
           </a:p>
@@ -3911,7 +3913,7 @@
             <a:fld id="{8818C68F-D26B-8F47-958C-23B49CF8A634}" type="datetimeFigureOut">
               <a:rPr lang="en-US" dirty="0"/>
               <a:pPr/>
-              <a:t>12/1/2022</a:t>
+              <a:t>12/4/22</a:t>
             </a:fld>
             <a:endParaRPr lang="en-US"/>
           </a:p>
@@ -4180,7 +4182,7 @@
           <a:ln/>
           <a:extLst>
             <a:ext uri="{91240B29-F687-4f45-9708-019B960494DF}">
-              <a14:hiddenLine xmlns:a14="http://schemas.microsoft.com/office/drawing/2010/main" xmlns="" w="9525">
+              <a14:hiddenLine xmlns="" xmlns:a14="http://schemas.microsoft.com/office/drawing/2010/main" w="9525">
                 <a:solidFill>
                   <a:srgbClr val="000000"/>
                 </a:solidFill>
@@ -4378,7 +4380,7 @@
             <a:fld id="{D0DF5E60-9974-AC48-9591-99C2BB44B7CF}" type="datetimeFigureOut">
               <a:rPr lang="en-US" dirty="0"/>
               <a:pPr/>
-              <a:t>12/1/2022</a:t>
+              <a:t>12/4/22</a:t>
             </a:fld>
             <a:endParaRPr lang="en-US"/>
           </a:p>
@@ -4688,7 +4690,7 @@
             <a:fld id="{18C79C5D-2A6F-F04D-97DA-BEF2467B64E4}" type="datetimeFigureOut">
               <a:rPr lang="en-US" dirty="0"/>
               <a:pPr/>
-              <a:t>12/1/2022</a:t>
+              <a:t>12/4/22</a:t>
             </a:fld>
             <a:endParaRPr lang="en-US"/>
           </a:p>
@@ -4958,7 +4960,7 @@
             <a:fld id="{09B482E8-6E0E-1B4F-B1FD-C69DB9E858D9}" type="datetimeFigureOut">
               <a:rPr lang="en-US" dirty="0"/>
               <a:pPr/>
-              <a:t>12/1/2022</a:t>
+              <a:t>12/4/22</a:t>
             </a:fld>
             <a:endParaRPr lang="en-US"/>
           </a:p>
@@ -5446,10 +5448,73 @@
           <a:bodyPr/>
           <a:lstStyle/>
           <a:p>
-            <a:endParaRPr lang="en-US"/>
-          </a:p>
-        </p:txBody>
-      </p:sp>
+            <a:r>
+              <a:rPr lang="en-US" dirty="0"/>
+              <a:t>Logan O'Neal, Caleb Fisher, Eric Vaughan, Jacob King, &amp; Hayden Curl</a:t>
+            </a:r>
+          </a:p>
+        </p:txBody>
+      </p:sp>
+      <p:pic>
+        <p:nvPicPr>
+          <p:cNvPr id="7" name="Picture 7">
+            <a:extLst>
+              <a:ext uri="{FF2B5EF4-FFF2-40B4-BE49-F238E27FC236}">
+                <a16:creationId xmlns:a16="http://schemas.microsoft.com/office/drawing/2014/main" id="{A4FAE54B-5167-AFC6-A1EE-DC1A347ED0D9}"/>
+              </a:ext>
+            </a:extLst>
+          </p:cNvPr>
+          <p:cNvPicPr>
+            <a:picLocks noChangeAspect="1"/>
+          </p:cNvPicPr>
+          <p:nvPr/>
+        </p:nvPicPr>
+        <p:blipFill>
+          <a:blip r:embed="rId2"/>
+          <a:stretch>
+            <a:fillRect/>
+          </a:stretch>
+        </p:blipFill>
+        <p:spPr>
+          <a:xfrm>
+            <a:off x="7278945" y="-123567"/>
+            <a:ext cx="5036264" cy="5049168"/>
+          </a:xfrm>
+          <a:prstGeom prst="rect">
+            <a:avLst/>
+          </a:prstGeom>
+        </p:spPr>
+      </p:pic>
+      <p:pic>
+        <p:nvPicPr>
+          <p:cNvPr id="4" name="Picture 4" descr="Qr code&#10;&#10;Description automatically generated">
+            <a:extLst>
+              <a:ext uri="{FF2B5EF4-FFF2-40B4-BE49-F238E27FC236}">
+                <a16:creationId xmlns:a16="http://schemas.microsoft.com/office/drawing/2014/main" id="{97CF30F6-22E6-ED54-017B-43A9E484D1A9}"/>
+              </a:ext>
+            </a:extLst>
+          </p:cNvPr>
+          <p:cNvPicPr>
+            <a:picLocks noChangeAspect="1"/>
+          </p:cNvPicPr>
+          <p:nvPr/>
+        </p:nvPicPr>
+        <p:blipFill>
+          <a:blip r:embed="rId3"/>
+          <a:stretch>
+            <a:fillRect/>
+          </a:stretch>
+        </p:blipFill>
+        <p:spPr>
+          <a:xfrm>
+            <a:off x="7914751" y="695230"/>
+            <a:ext cx="3647551" cy="3625339"/>
+          </a:xfrm>
+          <a:prstGeom prst="rect">
+            <a:avLst/>
+          </a:prstGeom>
+        </p:spPr>
+      </p:pic>
     </p:spTree>
     <p:extLst>
       <p:ext uri="{BB962C8B-B14F-4D97-AF65-F5344CB8AC3E}">
@@ -5466,14 +5531,6 @@
 <file path=ppt/slides/slide10.xml><?xml version="1.0" encoding="utf-8"?>
 <p:sld xmlns:a="http://schemas.openxmlformats.org/drawingml/2006/main" xmlns:r="http://schemas.openxmlformats.org/officeDocument/2006/relationships" xmlns:p="http://schemas.openxmlformats.org/presentationml/2006/main">
   <p:cSld>
-    <p:bg>
-      <p:bgPr>
-        <a:solidFill>
-          <a:schemeClr val="bg2"/>
-        </a:solidFill>
-        <a:effectLst/>
-      </p:bgPr>
-    </p:bg>
     <p:spTree>
       <p:nvGrpSpPr>
         <p:cNvPr id="1" name=""/>
@@ -5493,7 +5550,7 @@
           <p:cNvPr id="2" name="Title 1">
             <a:extLst>
               <a:ext uri="{FF2B5EF4-FFF2-40B4-BE49-F238E27FC236}">
-                <a16:creationId xmlns:a16="http://schemas.microsoft.com/office/drawing/2014/main" id="{ABBE2AC7-1A2B-D1C2-3E63-998049EC44B2}"/>
+                <a16:creationId xmlns:a16="http://schemas.microsoft.com/office/drawing/2014/main" id="{736F905B-E64A-D374-31D0-EB90047FFC68}"/>
               </a:ext>
             </a:extLst>
           </p:cNvPr>
@@ -5504,31 +5561,24 @@
             <p:ph type="title"/>
           </p:nvPr>
         </p:nvSpPr>
-        <p:spPr>
-          <a:xfrm>
-            <a:off x="810000" y="447188"/>
-            <a:ext cx="10571998" cy="970450"/>
-          </a:xfrm>
-        </p:spPr>
-        <p:txBody>
-          <a:bodyPr>
-            <a:normAutofit/>
-          </a:bodyPr>
-          <a:lstStyle/>
-          <a:p>
-            <a:r>
-              <a:rPr lang="en-US" dirty="0"/>
-              <a:t>Details Page: Download &amp; Customization</a:t>
-            </a:r>
-          </a:p>
-        </p:txBody>
-      </p:sp>
-      <p:sp>
-        <p:nvSpPr>
-          <p:cNvPr id="8" name="Content Placeholder 7">
+        <p:spPr/>
+        <p:txBody>
+          <a:bodyPr/>
+          <a:lstStyle/>
+          <a:p>
+            <a:r>
+              <a:rPr lang="en-US"/>
+              <a:t>QR Validation Service</a:t>
+            </a:r>
+          </a:p>
+        </p:txBody>
+      </p:sp>
+      <p:sp>
+        <p:nvSpPr>
+          <p:cNvPr id="3" name="Content Placeholder 2">
             <a:extLst>
               <a:ext uri="{FF2B5EF4-FFF2-40B4-BE49-F238E27FC236}">
-                <a16:creationId xmlns:a16="http://schemas.microsoft.com/office/drawing/2014/main" id="{73FB3D03-393E-DF0C-58F2-36E9E361A86C}"/>
+                <a16:creationId xmlns:a16="http://schemas.microsoft.com/office/drawing/2014/main" id="{2A67D933-4638-371C-E1C5-9B9A5E6DB399}"/>
               </a:ext>
             </a:extLst>
           </p:cNvPr>
@@ -5541,86 +5591,46 @@
         </p:nvSpPr>
         <p:spPr>
           <a:xfrm>
-            <a:off x="818713" y="2413000"/>
-            <a:ext cx="3835583" cy="3632200"/>
-          </a:xfrm>
-        </p:spPr>
-        <p:txBody>
-          <a:bodyPr>
-            <a:normAutofit/>
-          </a:bodyPr>
-          <a:lstStyle/>
-          <a:p>
-            <a:r>
-              <a:rPr lang="en-US" sz="1600" dirty="0"/>
-              <a:t>Downloads QR Code as a PNG file</a:t>
-            </a:r>
-            <a:endParaRPr lang="en-US" sz="1600"/>
-          </a:p>
-          <a:p>
-            <a:r>
-              <a:rPr lang="en-US" sz="1600" dirty="0"/>
-              <a:t>Download customization options:</a:t>
-            </a:r>
-          </a:p>
-          <a:p>
-            <a:pPr lvl="1"/>
-            <a:r>
-              <a:rPr lang="en-US"/>
-              <a:t>Specify color</a:t>
-            </a:r>
-          </a:p>
-          <a:p>
-            <a:pPr lvl="1"/>
-            <a:r>
-              <a:rPr lang="en-US"/>
-              <a:t>Add a logo</a:t>
-            </a:r>
-          </a:p>
-        </p:txBody>
-      </p:sp>
-      <p:pic>
-        <p:nvPicPr>
-          <p:cNvPr id="5" name="Picture 5" descr="Graphical user interface&#10;&#10;Description automatically generated">
-            <a:extLst>
-              <a:ext uri="{FF2B5EF4-FFF2-40B4-BE49-F238E27FC236}">
-                <a16:creationId xmlns:a16="http://schemas.microsoft.com/office/drawing/2014/main" id="{4A74B9FF-5560-3A12-D2B3-2DA305AA72CA}"/>
-              </a:ext>
-            </a:extLst>
-          </p:cNvPr>
-          <p:cNvPicPr>
-            <a:picLocks noChangeAspect="1"/>
-          </p:cNvPicPr>
-          <p:nvPr/>
-        </p:nvPicPr>
-        <p:blipFill>
-          <a:blip r:embed="rId2"/>
-          <a:stretch>
-            <a:fillRect/>
-          </a:stretch>
-        </p:blipFill>
-        <p:spPr>
-          <a:xfrm>
-            <a:off x="5134090" y="1901210"/>
-            <a:ext cx="6372095" cy="4956009"/>
-          </a:xfrm>
-          <a:prstGeom prst="roundRect">
-            <a:avLst>
-              <a:gd name="adj" fmla="val 3876"/>
-            </a:avLst>
-          </a:prstGeom>
-          <a:ln>
-            <a:solidFill>
-              <a:schemeClr val="accent1"/>
-            </a:solidFill>
-          </a:ln>
-          <a:effectLst/>
-        </p:spPr>
-      </p:pic>
+            <a:off x="808552" y="2222287"/>
+            <a:ext cx="4773534" cy="3636511"/>
+          </a:xfrm>
+        </p:spPr>
+        <p:txBody>
+          <a:bodyPr/>
+          <a:lstStyle/>
+          <a:p>
+            <a:r>
+              <a:rPr lang="en-US"/>
+              <a:t>Runs every 15 minutes </a:t>
+            </a:r>
+          </a:p>
+          <a:p>
+            <a:r>
+              <a:rPr lang="en-US"/>
+              <a:t>Check every QR link for broken endpoints and alerts the user to issues using the QR list.</a:t>
+            </a:r>
+          </a:p>
+          <a:p>
+            <a:r>
+              <a:rPr lang="en-US"/>
+              <a:t>User homepage keeps track of total broken links</a:t>
+            </a:r>
+          </a:p>
+          <a:p>
+            <a:pPr marL="0" indent="0">
+              <a:buNone/>
+            </a:pPr>
+            <a:endParaRPr lang="en-US"/>
+          </a:p>
+          <a:p>
+            <a:endParaRPr lang="en-US"/>
+          </a:p>
+        </p:txBody>
+      </p:sp>
     </p:spTree>
     <p:extLst>
       <p:ext uri="{BB962C8B-B14F-4D97-AF65-F5344CB8AC3E}">
-        <p14:creationId xmlns:p14="http://schemas.microsoft.com/office/powerpoint/2010/main" val="1301274481"/>
+        <p14:creationId xmlns:p14="http://schemas.microsoft.com/office/powerpoint/2010/main" val="3137855217"/>
       </p:ext>
     </p:extLst>
   </p:cSld>
@@ -5660,7 +5670,7 @@
           <p:cNvPr id="2" name="Title 1">
             <a:extLst>
               <a:ext uri="{FF2B5EF4-FFF2-40B4-BE49-F238E27FC236}">
-                <a16:creationId xmlns:a16="http://schemas.microsoft.com/office/drawing/2014/main" id="{3BAB6414-87DF-5341-1DD7-791ADC83B5B3}"/>
+                <a16:creationId xmlns:a16="http://schemas.microsoft.com/office/drawing/2014/main" id="{ABBE2AC7-1A2B-D1C2-3E63-998049EC44B2}"/>
               </a:ext>
             </a:extLst>
           </p:cNvPr>
@@ -5685,7 +5695,7 @@
           <a:p>
             <a:r>
               <a:rPr lang="en-US" dirty="0"/>
-              <a:t>Details Page: QR Code Information</a:t>
+              <a:t>Details Page: Download &amp; Customization</a:t>
             </a:r>
           </a:p>
         </p:txBody>
@@ -5695,7 +5705,7 @@
           <p:cNvPr id="8" name="Content Placeholder 7">
             <a:extLst>
               <a:ext uri="{FF2B5EF4-FFF2-40B4-BE49-F238E27FC236}">
-                <a16:creationId xmlns:a16="http://schemas.microsoft.com/office/drawing/2014/main" id="{725312C2-C407-1B70-45D0-5CBCA44314DF}"/>
+                <a16:creationId xmlns:a16="http://schemas.microsoft.com/office/drawing/2014/main" id="{73FB3D03-393E-DF0C-58F2-36E9E361A86C}"/>
               </a:ext>
             </a:extLst>
           </p:cNvPr>
@@ -5720,23 +5730,38 @@
           <a:p>
             <a:r>
               <a:rPr lang="en-US" sz="1600" dirty="0"/>
-              <a:t>Displays the link, description, and usage stats</a:t>
-            </a:r>
+              <a:t>Downloads QR Code as a PNG file</a:t>
+            </a:r>
+            <a:endParaRPr lang="en-US" sz="1600"/>
           </a:p>
           <a:p>
             <a:r>
               <a:rPr lang="en-US" sz="1600" dirty="0"/>
-              <a:t>Can update the link and description</a:t>
+              <a:t>Download customization options:</a:t>
+            </a:r>
+          </a:p>
+          <a:p>
+            <a:pPr lvl="1"/>
+            <a:r>
+              <a:rPr lang="en-US"/>
+              <a:t>Specify color</a:t>
+            </a:r>
+          </a:p>
+          <a:p>
+            <a:pPr lvl="1"/>
+            <a:r>
+              <a:rPr lang="en-US"/>
+              <a:t>Add a logo</a:t>
             </a:r>
           </a:p>
         </p:txBody>
       </p:sp>
       <p:pic>
         <p:nvPicPr>
-          <p:cNvPr id="13" name="Picture 13" descr="Graphical user interface&#10;&#10;Description automatically generated">
+          <p:cNvPr id="5" name="Picture 5" descr="Graphical user interface&#10;&#10;Description automatically generated">
             <a:extLst>
               <a:ext uri="{FF2B5EF4-FFF2-40B4-BE49-F238E27FC236}">
-                <a16:creationId xmlns:a16="http://schemas.microsoft.com/office/drawing/2014/main" id="{CDCDA340-7C06-B141-ED2B-E535E5D7F37F}"/>
+                <a16:creationId xmlns:a16="http://schemas.microsoft.com/office/drawing/2014/main" id="{4A74B9FF-5560-3A12-D2B3-2DA305AA72CA}"/>
               </a:ext>
             </a:extLst>
           </p:cNvPr>
@@ -5753,8 +5778,8 @@
         </p:blipFill>
         <p:spPr>
           <a:xfrm>
-            <a:off x="5186860" y="1901210"/>
-            <a:ext cx="6414404" cy="4956009"/>
+            <a:off x="5134090" y="1901210"/>
+            <a:ext cx="6372095" cy="4956009"/>
           </a:xfrm>
           <a:prstGeom prst="roundRect">
             <a:avLst>
@@ -5772,7 +5797,7 @@
     </p:spTree>
     <p:extLst>
       <p:ext uri="{BB962C8B-B14F-4D97-AF65-F5344CB8AC3E}">
-        <p14:creationId xmlns:p14="http://schemas.microsoft.com/office/powerpoint/2010/main" val="998476913"/>
+        <p14:creationId xmlns:p14="http://schemas.microsoft.com/office/powerpoint/2010/main" val="1301274481"/>
       </p:ext>
     </p:extLst>
   </p:cSld>
@@ -5782,7 +5807,7 @@
 </p:sld>
 </file>
 
-<file path=ppt/slides/slide2.xml><?xml version="1.0" encoding="utf-8"?>
+<file path=ppt/slides/slide12.xml><?xml version="1.0" encoding="utf-8"?>
 <p:sld xmlns:a="http://schemas.openxmlformats.org/drawingml/2006/main" xmlns:r="http://schemas.openxmlformats.org/officeDocument/2006/relationships" xmlns:p="http://schemas.openxmlformats.org/presentationml/2006/main">
   <p:cSld>
     <p:bg>
@@ -5812,7 +5837,7 @@
           <p:cNvPr id="2" name="Title 1">
             <a:extLst>
               <a:ext uri="{FF2B5EF4-FFF2-40B4-BE49-F238E27FC236}">
-                <a16:creationId xmlns:a16="http://schemas.microsoft.com/office/drawing/2014/main" id="{C1176812-9CAA-06FF-7544-9AD3A2DD4143}"/>
+                <a16:creationId xmlns:a16="http://schemas.microsoft.com/office/drawing/2014/main" id="{3BAB6414-87DF-5341-1DD7-791ADC83B5B3}"/>
               </a:ext>
             </a:extLst>
           </p:cNvPr>
@@ -5837,7 +5862,7 @@
           <a:p>
             <a:r>
               <a:rPr lang="en-US" dirty="0"/>
-              <a:t>Sign In Page</a:t>
+              <a:t>Details Page: QR Code Information</a:t>
             </a:r>
           </a:p>
         </p:txBody>
@@ -5847,7 +5872,7 @@
           <p:cNvPr id="8" name="Content Placeholder 7">
             <a:extLst>
               <a:ext uri="{FF2B5EF4-FFF2-40B4-BE49-F238E27FC236}">
-                <a16:creationId xmlns:a16="http://schemas.microsoft.com/office/drawing/2014/main" id="{F1768F43-F9DB-CDF1-B6B5-4CD67D9BEBFF}"/>
+                <a16:creationId xmlns:a16="http://schemas.microsoft.com/office/drawing/2014/main" id="{725312C2-C407-1B70-45D0-5CBCA44314DF}"/>
               </a:ext>
             </a:extLst>
           </p:cNvPr>
@@ -5872,29 +5897,23 @@
           <a:p>
             <a:r>
               <a:rPr lang="en-US" sz="1600" dirty="0"/>
-              <a:t>Only info needed to create an account is a username and password</a:t>
-            </a:r>
-          </a:p>
-          <a:p>
-            <a:r>
-              <a:rPr lang="en-US" sz="1600" dirty="0">
-                <a:ea typeface="+mn-lt"/>
-                <a:cs typeface="+mn-lt"/>
-              </a:rPr>
-              <a:t>Password requirements to improve security</a:t>
-            </a:r>
-          </a:p>
-          <a:p>
-            <a:endParaRPr lang="en-US" sz="1600" dirty="0"/>
+              <a:t>Displays the link, description, and usage stats</a:t>
+            </a:r>
+          </a:p>
+          <a:p>
+            <a:r>
+              <a:rPr lang="en-US" sz="1600" dirty="0"/>
+              <a:t>Can update the link and description</a:t>
+            </a:r>
           </a:p>
         </p:txBody>
       </p:sp>
       <p:pic>
         <p:nvPicPr>
-          <p:cNvPr id="4" name="Picture 4" descr="Graphical user interface&#10;&#10;Description automatically generated">
+          <p:cNvPr id="13" name="Picture 13" descr="Graphical user interface&#10;&#10;Description automatically generated">
             <a:extLst>
               <a:ext uri="{FF2B5EF4-FFF2-40B4-BE49-F238E27FC236}">
-                <a16:creationId xmlns:a16="http://schemas.microsoft.com/office/drawing/2014/main" id="{F92CA6C4-DA84-B8A1-F1FA-074236F87BB0}"/>
+                <a16:creationId xmlns:a16="http://schemas.microsoft.com/office/drawing/2014/main" id="{CDCDA340-7C06-B141-ED2B-E535E5D7F37F}"/>
               </a:ext>
             </a:extLst>
           </p:cNvPr>
@@ -5911,8 +5930,8 @@
         </p:blipFill>
         <p:spPr>
           <a:xfrm>
-            <a:off x="4736688" y="2037366"/>
-            <a:ext cx="7340380" cy="4692985"/>
+            <a:off x="5186860" y="1901210"/>
+            <a:ext cx="6414404" cy="4956009"/>
           </a:xfrm>
           <a:prstGeom prst="roundRect">
             <a:avLst>
@@ -5930,7 +5949,135 @@
     </p:spTree>
     <p:extLst>
       <p:ext uri="{BB962C8B-B14F-4D97-AF65-F5344CB8AC3E}">
-        <p14:creationId xmlns:p14="http://schemas.microsoft.com/office/powerpoint/2010/main" val="2965989704"/>
+        <p14:creationId xmlns:p14="http://schemas.microsoft.com/office/powerpoint/2010/main" val="998476913"/>
+      </p:ext>
+    </p:extLst>
+  </p:cSld>
+  <p:clrMapOvr>
+    <a:masterClrMapping/>
+  </p:clrMapOvr>
+</p:sld>
+</file>
+
+<file path=ppt/slides/slide2.xml><?xml version="1.0" encoding="utf-8"?>
+<p:sld xmlns:a="http://schemas.openxmlformats.org/drawingml/2006/main" xmlns:r="http://schemas.openxmlformats.org/officeDocument/2006/relationships" xmlns:p="http://schemas.openxmlformats.org/presentationml/2006/main">
+  <p:cSld>
+    <p:spTree>
+      <p:nvGrpSpPr>
+        <p:cNvPr id="1" name=""/>
+        <p:cNvGrpSpPr/>
+        <p:nvPr/>
+      </p:nvGrpSpPr>
+      <p:grpSpPr>
+        <a:xfrm>
+          <a:off x="0" y="0"/>
+          <a:ext cx="0" cy="0"/>
+          <a:chOff x="0" y="0"/>
+          <a:chExt cx="0" cy="0"/>
+        </a:xfrm>
+      </p:grpSpPr>
+      <p:sp>
+        <p:nvSpPr>
+          <p:cNvPr id="2" name="Title 1">
+            <a:extLst>
+              <a:ext uri="{FF2B5EF4-FFF2-40B4-BE49-F238E27FC236}">
+                <a16:creationId xmlns:a16="http://schemas.microsoft.com/office/drawing/2014/main" id="{97C5ECEA-6953-9DA8-EF85-112BE9C82C47}"/>
+              </a:ext>
+            </a:extLst>
+          </p:cNvPr>
+          <p:cNvSpPr>
+            <a:spLocks noGrp="1"/>
+          </p:cNvSpPr>
+          <p:nvPr>
+            <p:ph type="title"/>
+          </p:nvPr>
+        </p:nvSpPr>
+        <p:spPr/>
+        <p:txBody>
+          <a:bodyPr/>
+          <a:lstStyle/>
+          <a:p>
+            <a:r>
+              <a:rPr lang="en-US" dirty="0"/>
+              <a:t>Tech Stack</a:t>
+            </a:r>
+          </a:p>
+        </p:txBody>
+      </p:sp>
+      <p:sp>
+        <p:nvSpPr>
+          <p:cNvPr id="3" name="Content Placeholder 2">
+            <a:extLst>
+              <a:ext uri="{FF2B5EF4-FFF2-40B4-BE49-F238E27FC236}">
+                <a16:creationId xmlns:a16="http://schemas.microsoft.com/office/drawing/2014/main" id="{75BC9538-21DC-AF6C-6AC3-89EEAEC3EF2E}"/>
+              </a:ext>
+            </a:extLst>
+          </p:cNvPr>
+          <p:cNvSpPr>
+            <a:spLocks noGrp="1"/>
+          </p:cNvSpPr>
+          <p:nvPr>
+            <p:ph idx="1"/>
+          </p:nvPr>
+        </p:nvSpPr>
+        <p:spPr/>
+        <p:txBody>
+          <a:bodyPr vert="horz" lIns="91440" tIns="45720" rIns="91440" bIns="45720" rtlCol="0" anchor="t">
+            <a:normAutofit/>
+          </a:bodyPr>
+          <a:lstStyle/>
+          <a:p>
+            <a:pPr marL="285750" indent="-285750"/>
+            <a:r>
+              <a:rPr lang="en-US" dirty="0"/>
+              <a:t>Frontend:</a:t>
+            </a:r>
+          </a:p>
+          <a:p>
+            <a:pPr marL="685800" lvl="1"/>
+            <a:r>
+              <a:rPr lang="en-US" dirty="0"/>
+              <a:t>React, JavaScript, Material UI</a:t>
+            </a:r>
+          </a:p>
+          <a:p>
+            <a:pPr marL="285750" indent="-285750"/>
+            <a:r>
+              <a:rPr lang="en-US" dirty="0"/>
+              <a:t>Backend:</a:t>
+            </a:r>
+          </a:p>
+          <a:p>
+            <a:pPr marL="685800" lvl="1"/>
+            <a:r>
+              <a:rPr lang="en-US" dirty="0"/>
+              <a:t>NodeJS, Express</a:t>
+            </a:r>
+          </a:p>
+          <a:p>
+            <a:pPr marL="285750" indent="-285750"/>
+            <a:r>
+              <a:rPr lang="en-US" dirty="0"/>
+              <a:t>Database:</a:t>
+            </a:r>
+          </a:p>
+          <a:p>
+            <a:pPr marL="685800" lvl="1"/>
+            <a:r>
+              <a:rPr lang="en-US" dirty="0"/>
+              <a:t>MySQL, GCP Cloud SQL</a:t>
+            </a:r>
+          </a:p>
+          <a:p>
+            <a:pPr marL="685800" lvl="1"/>
+            <a:endParaRPr lang="en-US" dirty="0"/>
+          </a:p>
+        </p:txBody>
+      </p:sp>
+    </p:spTree>
+    <p:extLst>
+      <p:ext uri="{BB962C8B-B14F-4D97-AF65-F5344CB8AC3E}">
+        <p14:creationId xmlns:p14="http://schemas.microsoft.com/office/powerpoint/2010/main" val="2401946404"/>
       </p:ext>
     </p:extLst>
   </p:cSld>
@@ -5970,7 +6117,7 @@
           <p:cNvPr id="2" name="Title 1">
             <a:extLst>
               <a:ext uri="{FF2B5EF4-FFF2-40B4-BE49-F238E27FC236}">
-                <a16:creationId xmlns:a16="http://schemas.microsoft.com/office/drawing/2014/main" id="{0F82E872-5312-15B6-EE52-B81D527CD6FC}"/>
+                <a16:creationId xmlns:a16="http://schemas.microsoft.com/office/drawing/2014/main" id="{C1176812-9CAA-06FF-7544-9AD3A2DD4143}"/>
               </a:ext>
             </a:extLst>
           </p:cNvPr>
@@ -5988,121 +6135,78 @@
           </a:xfrm>
         </p:spPr>
         <p:txBody>
-          <a:bodyPr vert="horz" lIns="91440" tIns="45720" rIns="91440" bIns="45720" rtlCol="0" anchor="b">
+          <a:bodyPr>
             <a:normAutofit/>
           </a:bodyPr>
           <a:lstStyle/>
           <a:p>
             <a:r>
-              <a:rPr lang="en-US"/>
-              <a:t>OAuth CLI</a:t>
-            </a:r>
-          </a:p>
-        </p:txBody>
-      </p:sp>
-      <p:sp>
-        <p:nvSpPr>
-          <p:cNvPr id="3" name="TextBox 2">
+              <a:rPr lang="en-US" dirty="0"/>
+              <a:t>Sign In Page</a:t>
+            </a:r>
+          </a:p>
+        </p:txBody>
+      </p:sp>
+      <p:sp>
+        <p:nvSpPr>
+          <p:cNvPr id="8" name="Content Placeholder 7">
             <a:extLst>
               <a:ext uri="{FF2B5EF4-FFF2-40B4-BE49-F238E27FC236}">
-                <a16:creationId xmlns:a16="http://schemas.microsoft.com/office/drawing/2014/main" id="{A90A744A-F65C-220E-75C5-E9B1A1077F8F}"/>
+                <a16:creationId xmlns:a16="http://schemas.microsoft.com/office/drawing/2014/main" id="{F1768F43-F9DB-CDF1-B6B5-4CD67D9BEBFF}"/>
               </a:ext>
             </a:extLst>
           </p:cNvPr>
-          <p:cNvSpPr txBox="1"/>
-          <p:nvPr/>
+          <p:cNvSpPr>
+            <a:spLocks noGrp="1"/>
+          </p:cNvSpPr>
+          <p:nvPr>
+            <p:ph idx="1"/>
+          </p:nvPr>
         </p:nvSpPr>
         <p:spPr>
           <a:xfrm>
             <a:off x="818713" y="2413000"/>
             <a:ext cx="3835583" cy="3632200"/>
           </a:xfrm>
-          <a:prstGeom prst="rect">
-            <a:avLst/>
-          </a:prstGeom>
-        </p:spPr>
-        <p:txBody>
-          <a:bodyPr rot="0" spcFirstLastPara="0" vertOverflow="overflow" horzOverflow="overflow" vert="horz" lIns="91440" tIns="45720" rIns="91440" bIns="45720" numCol="1" spcCol="0" rtlCol="0" fromWordArt="0" anchor="ctr" anchorCtr="0" forceAA="0" compatLnSpc="1">
-            <a:prstTxWarp prst="textNoShape">
-              <a:avLst/>
-            </a:prstTxWarp>
+        </p:spPr>
+        <p:txBody>
+          <a:bodyPr>
             <a:normAutofit/>
           </a:bodyPr>
           <a:lstStyle/>
           <a:p>
-            <a:pPr marL="285750" indent="-285750" defTabSz="457200">
-              <a:spcBef>
-                <a:spcPct val="20000"/>
-              </a:spcBef>
-              <a:spcAft>
-                <a:spcPts val="600"/>
-              </a:spcAft>
-              <a:buClr>
-                <a:schemeClr val="accent1"/>
-              </a:buClr>
-              <a:buFont typeface="Wingdings 2" charset="2"/>
-              <a:buChar char=""/>
-            </a:pPr>
             <a:r>
               <a:rPr lang="en-US" sz="1600" dirty="0"/>
-              <a:t>An authorization code is sent back to the client on successful login.</a:t>
-            </a:r>
-          </a:p>
-          <a:p>
-            <a:pPr marL="285750" indent="-285750" defTabSz="457200">
-              <a:spcBef>
-                <a:spcPct val="20000"/>
-              </a:spcBef>
-              <a:spcAft>
-                <a:spcPts val="600"/>
-              </a:spcAft>
-              <a:buClr>
-                <a:schemeClr val="accent1"/>
-              </a:buClr>
-              <a:buFont typeface="Wingdings 2" charset="2"/>
-              <a:buChar char=""/>
-            </a:pPr>
-            <a:r>
-              <a:rPr lang="en-US" sz="1600" dirty="0"/>
-              <a:t>The authorization code is then sent to our backend server to validate the code and return an access token (JWT).</a:t>
-            </a:r>
-          </a:p>
-          <a:p>
-            <a:pPr marL="285750" indent="-285750" defTabSz="457200">
-              <a:spcBef>
-                <a:spcPct val="20000"/>
-              </a:spcBef>
-              <a:spcAft>
-                <a:spcPts val="600"/>
-              </a:spcAft>
-              <a:buClr>
-                <a:schemeClr val="accent1"/>
-              </a:buClr>
-              <a:buFont typeface="Wingdings 2" charset="2"/>
-              <a:buChar char=""/>
-            </a:pPr>
-            <a:r>
-              <a:rPr lang="en-US" sz="1600" dirty="0"/>
-              <a:t>This access token can be used to access protected resources such as our bulk QR management service.</a:t>
-            </a:r>
+              <a:t>Only info needed to create an account is a username and password</a:t>
+            </a:r>
+          </a:p>
+          <a:p>
+            <a:r>
+              <a:rPr lang="en-US" sz="1600" dirty="0">
+                <a:ea typeface="+mn-lt"/>
+                <a:cs typeface="+mn-lt"/>
+              </a:rPr>
+              <a:t>Password requirements to improve security</a:t>
+            </a:r>
+          </a:p>
+          <a:p>
+            <a:endParaRPr lang="en-US" sz="1600" dirty="0"/>
           </a:p>
         </p:txBody>
       </p:sp>
       <p:pic>
         <p:nvPicPr>
-          <p:cNvPr id="4" name="Picture 4">
+          <p:cNvPr id="4" name="Picture 4" descr="Graphical user interface&#10;&#10;Description automatically generated">
             <a:extLst>
               <a:ext uri="{FF2B5EF4-FFF2-40B4-BE49-F238E27FC236}">
-                <a16:creationId xmlns:a16="http://schemas.microsoft.com/office/drawing/2014/main" id="{06D69194-50E1-6882-DCF8-19AE4907FDB6}"/>
+                <a16:creationId xmlns:a16="http://schemas.microsoft.com/office/drawing/2014/main" id="{F92CA6C4-DA84-B8A1-F1FA-074236F87BB0}"/>
               </a:ext>
             </a:extLst>
           </p:cNvPr>
           <p:cNvPicPr>
-            <a:picLocks noGrp="1" noChangeAspect="1"/>
+            <a:picLocks noChangeAspect="1"/>
           </p:cNvPicPr>
-          <p:nvPr>
-            <p:ph idx="1"/>
-          </p:nvPr>
+          <p:nvPr/>
         </p:nvPicPr>
         <p:blipFill>
           <a:blip r:embed="rId2"/>
@@ -6112,8 +6216,8 @@
         </p:blipFill>
         <p:spPr>
           <a:xfrm>
-            <a:off x="5101851" y="2576285"/>
-            <a:ext cx="6277349" cy="3389767"/>
+            <a:off x="4736688" y="2037366"/>
+            <a:ext cx="7340380" cy="4692985"/>
           </a:xfrm>
           <a:prstGeom prst="roundRect">
             <a:avLst>
@@ -6131,7 +6235,7 @@
     </p:spTree>
     <p:extLst>
       <p:ext uri="{BB962C8B-B14F-4D97-AF65-F5344CB8AC3E}">
-        <p14:creationId xmlns:p14="http://schemas.microsoft.com/office/powerpoint/2010/main" val="1727285179"/>
+        <p14:creationId xmlns:p14="http://schemas.microsoft.com/office/powerpoint/2010/main" val="2965989704"/>
       </p:ext>
     </p:extLst>
   </p:cSld>
@@ -6142,155 +6246,6 @@
 </file>
 
 <file path=ppt/slides/slide4.xml><?xml version="1.0" encoding="utf-8"?>
-<p:sld xmlns:a="http://schemas.openxmlformats.org/drawingml/2006/main" xmlns:r="http://schemas.openxmlformats.org/officeDocument/2006/relationships" xmlns:p="http://schemas.openxmlformats.org/presentationml/2006/main">
-  <p:cSld>
-    <p:spTree>
-      <p:nvGrpSpPr>
-        <p:cNvPr id="1" name=""/>
-        <p:cNvGrpSpPr/>
-        <p:nvPr/>
-      </p:nvGrpSpPr>
-      <p:grpSpPr>
-        <a:xfrm>
-          <a:off x="0" y="0"/>
-          <a:ext cx="0" cy="0"/>
-          <a:chOff x="0" y="0"/>
-          <a:chExt cx="0" cy="0"/>
-        </a:xfrm>
-      </p:grpSpPr>
-      <p:sp>
-        <p:nvSpPr>
-          <p:cNvPr id="2" name="Title 1">
-            <a:extLst>
-              <a:ext uri="{FF2B5EF4-FFF2-40B4-BE49-F238E27FC236}">
-                <a16:creationId xmlns:a16="http://schemas.microsoft.com/office/drawing/2014/main" id="{348A42B0-AA2C-C1D1-65C3-EA43BCBFDF53}"/>
-              </a:ext>
-            </a:extLst>
-          </p:cNvPr>
-          <p:cNvSpPr>
-            <a:spLocks noGrp="1"/>
-          </p:cNvSpPr>
-          <p:nvPr>
-            <p:ph type="title"/>
-          </p:nvPr>
-        </p:nvSpPr>
-        <p:spPr/>
-        <p:txBody>
-          <a:bodyPr/>
-          <a:lstStyle/>
-          <a:p>
-            <a:r>
-              <a:rPr lang="en-US">
-                <a:ea typeface="+mj-lt"/>
-                <a:cs typeface="+mj-lt"/>
-              </a:rPr>
-              <a:t>OAuth CLI</a:t>
-            </a:r>
-          </a:p>
-        </p:txBody>
-      </p:sp>
-      <p:pic>
-        <p:nvPicPr>
-          <p:cNvPr id="4" name="Picture 4" descr="Text&#10;&#10;Description automatically generated">
-            <a:extLst>
-              <a:ext uri="{FF2B5EF4-FFF2-40B4-BE49-F238E27FC236}">
-                <a16:creationId xmlns:a16="http://schemas.microsoft.com/office/drawing/2014/main" id="{6350D5D5-8244-AABD-56A3-ABEA0DF50CA6}"/>
-              </a:ext>
-            </a:extLst>
-          </p:cNvPr>
-          <p:cNvPicPr>
-            <a:picLocks noGrp="1" noChangeAspect="1"/>
-          </p:cNvPicPr>
-          <p:nvPr>
-            <p:ph idx="1"/>
-          </p:nvPr>
-        </p:nvPicPr>
-        <p:blipFill rotWithShape="1">
-          <a:blip r:embed="rId2"/>
-          <a:srcRect t="-920" r="121" b="66258"/>
-          <a:stretch/>
-        </p:blipFill>
-        <p:spPr>
-          <a:xfrm>
-            <a:off x="206139" y="2300054"/>
-            <a:ext cx="7743953" cy="1063122"/>
-          </a:xfrm>
-        </p:spPr>
-      </p:pic>
-      <p:pic>
-        <p:nvPicPr>
-          <p:cNvPr id="7" name="Picture 7" descr="Graphical user interface, website&#10;&#10;Description automatically generated">
-            <a:extLst>
-              <a:ext uri="{FF2B5EF4-FFF2-40B4-BE49-F238E27FC236}">
-                <a16:creationId xmlns:a16="http://schemas.microsoft.com/office/drawing/2014/main" id="{C6253B62-AEE0-86D2-F26D-74B8A3CC574A}"/>
-              </a:ext>
-            </a:extLst>
-          </p:cNvPr>
-          <p:cNvPicPr>
-            <a:picLocks noChangeAspect="1"/>
-          </p:cNvPicPr>
-          <p:nvPr/>
-        </p:nvPicPr>
-        <p:blipFill>
-          <a:blip r:embed="rId3"/>
-          <a:stretch>
-            <a:fillRect/>
-          </a:stretch>
-        </p:blipFill>
-        <p:spPr>
-          <a:xfrm>
-            <a:off x="209550" y="3367747"/>
-            <a:ext cx="4876800" cy="3494356"/>
-          </a:xfrm>
-          <a:prstGeom prst="rect">
-            <a:avLst/>
-          </a:prstGeom>
-        </p:spPr>
-      </p:pic>
-      <p:pic>
-        <p:nvPicPr>
-          <p:cNvPr id="8" name="Picture 8" descr="Text&#10;&#10;Description automatically generated">
-            <a:extLst>
-              <a:ext uri="{FF2B5EF4-FFF2-40B4-BE49-F238E27FC236}">
-                <a16:creationId xmlns:a16="http://schemas.microsoft.com/office/drawing/2014/main" id="{49FD665F-8F54-9A1D-3A9D-470669A0C70F}"/>
-              </a:ext>
-            </a:extLst>
-          </p:cNvPr>
-          <p:cNvPicPr>
-            <a:picLocks noChangeAspect="1"/>
-          </p:cNvPicPr>
-          <p:nvPr/>
-        </p:nvPicPr>
-        <p:blipFill>
-          <a:blip r:embed="rId4"/>
-          <a:stretch>
-            <a:fillRect/>
-          </a:stretch>
-        </p:blipFill>
-        <p:spPr>
-          <a:xfrm>
-            <a:off x="5139055" y="3480388"/>
-            <a:ext cx="6929120" cy="1421224"/>
-          </a:xfrm>
-          <a:prstGeom prst="rect">
-            <a:avLst/>
-          </a:prstGeom>
-        </p:spPr>
-      </p:pic>
-    </p:spTree>
-    <p:extLst>
-      <p:ext uri="{BB962C8B-B14F-4D97-AF65-F5344CB8AC3E}">
-        <p14:creationId xmlns:p14="http://schemas.microsoft.com/office/powerpoint/2010/main" val="2601916464"/>
-      </p:ext>
-    </p:extLst>
-  </p:cSld>
-  <p:clrMapOvr>
-    <a:masterClrMapping/>
-  </p:clrMapOvr>
-</p:sld>
-</file>
-
-<file path=ppt/slides/slide5.xml><?xml version="1.0" encoding="utf-8"?>
 <p:sld xmlns:a="http://schemas.openxmlformats.org/drawingml/2006/main" xmlns:r="http://schemas.openxmlformats.org/officeDocument/2006/relationships" xmlns:p="http://schemas.openxmlformats.org/presentationml/2006/main">
   <p:cSld>
     <p:bg>
@@ -6320,7 +6275,7 @@
           <p:cNvPr id="2" name="Title 1">
             <a:extLst>
               <a:ext uri="{FF2B5EF4-FFF2-40B4-BE49-F238E27FC236}">
-                <a16:creationId xmlns:a16="http://schemas.microsoft.com/office/drawing/2014/main" id="{64C087F3-9F42-3ABC-3AAB-B58CF92E19D2}"/>
+                <a16:creationId xmlns:a16="http://schemas.microsoft.com/office/drawing/2014/main" id="{0F82E872-5312-15B6-EE52-B81D527CD6FC}"/>
               </a:ext>
             </a:extLst>
           </p:cNvPr>
@@ -6338,63 +6293,121 @@
           </a:xfrm>
         </p:spPr>
         <p:txBody>
-          <a:bodyPr>
+          <a:bodyPr vert="horz" lIns="91440" tIns="45720" rIns="91440" bIns="45720" rtlCol="0" anchor="b">
             <a:normAutofit/>
           </a:bodyPr>
           <a:lstStyle/>
           <a:p>
             <a:r>
-              <a:rPr lang="en-US" dirty="0"/>
-              <a:t>Home Page</a:t>
-            </a:r>
-          </a:p>
-        </p:txBody>
-      </p:sp>
-      <p:sp>
-        <p:nvSpPr>
-          <p:cNvPr id="8" name="Content Placeholder 7">
+              <a:rPr lang="en-US"/>
+              <a:t>OAuth CLI</a:t>
+            </a:r>
+          </a:p>
+        </p:txBody>
+      </p:sp>
+      <p:sp>
+        <p:nvSpPr>
+          <p:cNvPr id="3" name="TextBox 2">
             <a:extLst>
               <a:ext uri="{FF2B5EF4-FFF2-40B4-BE49-F238E27FC236}">
-                <a16:creationId xmlns:a16="http://schemas.microsoft.com/office/drawing/2014/main" id="{1A026CDF-C9B7-2991-57CA-300D6CFD53D6}"/>
+                <a16:creationId xmlns:a16="http://schemas.microsoft.com/office/drawing/2014/main" id="{A90A744A-F65C-220E-75C5-E9B1A1077F8F}"/>
               </a:ext>
             </a:extLst>
           </p:cNvPr>
-          <p:cNvSpPr>
-            <a:spLocks noGrp="1"/>
-          </p:cNvSpPr>
-          <p:nvPr>
-            <p:ph idx="1"/>
-          </p:nvPr>
+          <p:cNvSpPr txBox="1"/>
+          <p:nvPr/>
         </p:nvSpPr>
         <p:spPr>
           <a:xfrm>
             <a:off x="818713" y="2413000"/>
             <a:ext cx="3835583" cy="3632200"/>
           </a:xfrm>
-        </p:spPr>
-        <p:txBody>
-          <a:bodyPr>
+          <a:prstGeom prst="rect">
+            <a:avLst/>
+          </a:prstGeom>
+        </p:spPr>
+        <p:txBody>
+          <a:bodyPr rot="0" spcFirstLastPara="0" vertOverflow="overflow" horzOverflow="overflow" vert="horz" lIns="91440" tIns="45720" rIns="91440" bIns="45720" numCol="1" spcCol="0" rtlCol="0" fromWordArt="0" anchor="ctr" anchorCtr="0" forceAA="0" compatLnSpc="1">
+            <a:prstTxWarp prst="textNoShape">
+              <a:avLst/>
+            </a:prstTxWarp>
             <a:normAutofit/>
           </a:bodyPr>
           <a:lstStyle/>
           <a:p>
-            <a:endParaRPr lang="en-US" sz="1600"/>
+            <a:pPr marL="285750" indent="-285750" defTabSz="457200">
+              <a:spcBef>
+                <a:spcPct val="20000"/>
+              </a:spcBef>
+              <a:spcAft>
+                <a:spcPts val="600"/>
+              </a:spcAft>
+              <a:buClr>
+                <a:schemeClr val="accent1"/>
+              </a:buClr>
+              <a:buFont typeface="Wingdings 2" charset="2"/>
+              <a:buChar char=""/>
+            </a:pPr>
+            <a:r>
+              <a:rPr lang="en-US" sz="1600" dirty="0"/>
+              <a:t>An authorization code is sent back to the client on successful login.</a:t>
+            </a:r>
+          </a:p>
+          <a:p>
+            <a:pPr marL="285750" indent="-285750" defTabSz="457200">
+              <a:spcBef>
+                <a:spcPct val="20000"/>
+              </a:spcBef>
+              <a:spcAft>
+                <a:spcPts val="600"/>
+              </a:spcAft>
+              <a:buClr>
+                <a:schemeClr val="accent1"/>
+              </a:buClr>
+              <a:buFont typeface="Wingdings 2" charset="2"/>
+              <a:buChar char=""/>
+            </a:pPr>
+            <a:r>
+              <a:rPr lang="en-US" sz="1600" dirty="0"/>
+              <a:t>The authorization code is then sent to our backend server to validate the code and return an access token (JWT).</a:t>
+            </a:r>
+          </a:p>
+          <a:p>
+            <a:pPr marL="285750" indent="-285750" defTabSz="457200">
+              <a:spcBef>
+                <a:spcPct val="20000"/>
+              </a:spcBef>
+              <a:spcAft>
+                <a:spcPts val="600"/>
+              </a:spcAft>
+              <a:buClr>
+                <a:schemeClr val="accent1"/>
+              </a:buClr>
+              <a:buFont typeface="Wingdings 2" charset="2"/>
+              <a:buChar char=""/>
+            </a:pPr>
+            <a:r>
+              <a:rPr lang="en-US" sz="1600" dirty="0"/>
+              <a:t>This access token can be used to access protected resources such as our bulk QR management service.</a:t>
+            </a:r>
           </a:p>
         </p:txBody>
       </p:sp>
       <p:pic>
         <p:nvPicPr>
-          <p:cNvPr id="4" name="Picture 4" descr="Graphical user interface&#10;&#10;Description automatically generated">
+          <p:cNvPr id="4" name="Picture 4">
             <a:extLst>
               <a:ext uri="{FF2B5EF4-FFF2-40B4-BE49-F238E27FC236}">
-                <a16:creationId xmlns:a16="http://schemas.microsoft.com/office/drawing/2014/main" id="{E85AC67F-CD89-5D4E-383A-04246A939387}"/>
+                <a16:creationId xmlns:a16="http://schemas.microsoft.com/office/drawing/2014/main" id="{06D69194-50E1-6882-DCF8-19AE4907FDB6}"/>
               </a:ext>
             </a:extLst>
           </p:cNvPr>
           <p:cNvPicPr>
-            <a:picLocks noChangeAspect="1"/>
+            <a:picLocks noGrp="1" noChangeAspect="1"/>
           </p:cNvPicPr>
-          <p:nvPr/>
+          <p:nvPr>
+            <p:ph idx="1"/>
+          </p:nvPr>
         </p:nvPicPr>
         <p:blipFill>
           <a:blip r:embed="rId2"/>
@@ -6404,8 +6417,8 @@
         </p:blipFill>
         <p:spPr>
           <a:xfrm>
-            <a:off x="2556913" y="2099235"/>
-            <a:ext cx="7075371" cy="4646426"/>
+            <a:off x="5101851" y="2576285"/>
+            <a:ext cx="6277349" cy="3389767"/>
           </a:xfrm>
           <a:prstGeom prst="roundRect">
             <a:avLst>
@@ -6423,7 +6436,156 @@
     </p:spTree>
     <p:extLst>
       <p:ext uri="{BB962C8B-B14F-4D97-AF65-F5344CB8AC3E}">
-        <p14:creationId xmlns:p14="http://schemas.microsoft.com/office/powerpoint/2010/main" val="2829471799"/>
+        <p14:creationId xmlns:p14="http://schemas.microsoft.com/office/powerpoint/2010/main" val="1727285179"/>
+      </p:ext>
+    </p:extLst>
+  </p:cSld>
+  <p:clrMapOvr>
+    <a:masterClrMapping/>
+  </p:clrMapOvr>
+</p:sld>
+</file>
+
+<file path=ppt/slides/slide5.xml><?xml version="1.0" encoding="utf-8"?>
+<p:sld xmlns:a="http://schemas.openxmlformats.org/drawingml/2006/main" xmlns:r="http://schemas.openxmlformats.org/officeDocument/2006/relationships" xmlns:p="http://schemas.openxmlformats.org/presentationml/2006/main">
+  <p:cSld>
+    <p:spTree>
+      <p:nvGrpSpPr>
+        <p:cNvPr id="1" name=""/>
+        <p:cNvGrpSpPr/>
+        <p:nvPr/>
+      </p:nvGrpSpPr>
+      <p:grpSpPr>
+        <a:xfrm>
+          <a:off x="0" y="0"/>
+          <a:ext cx="0" cy="0"/>
+          <a:chOff x="0" y="0"/>
+          <a:chExt cx="0" cy="0"/>
+        </a:xfrm>
+      </p:grpSpPr>
+      <p:sp>
+        <p:nvSpPr>
+          <p:cNvPr id="2" name="Title 1">
+            <a:extLst>
+              <a:ext uri="{FF2B5EF4-FFF2-40B4-BE49-F238E27FC236}">
+                <a16:creationId xmlns:a16="http://schemas.microsoft.com/office/drawing/2014/main" id="{348A42B0-AA2C-C1D1-65C3-EA43BCBFDF53}"/>
+              </a:ext>
+            </a:extLst>
+          </p:cNvPr>
+          <p:cNvSpPr>
+            <a:spLocks noGrp="1"/>
+          </p:cNvSpPr>
+          <p:nvPr>
+            <p:ph type="title"/>
+          </p:nvPr>
+        </p:nvSpPr>
+        <p:spPr/>
+        <p:txBody>
+          <a:bodyPr/>
+          <a:lstStyle/>
+          <a:p>
+            <a:r>
+              <a:rPr lang="en-US">
+                <a:ea typeface="+mj-lt"/>
+                <a:cs typeface="+mj-lt"/>
+              </a:rPr>
+              <a:t>OAuth CLI</a:t>
+            </a:r>
+          </a:p>
+        </p:txBody>
+      </p:sp>
+      <p:pic>
+        <p:nvPicPr>
+          <p:cNvPr id="4" name="Picture 4" descr="Text&#10;&#10;Description automatically generated">
+            <a:extLst>
+              <a:ext uri="{FF2B5EF4-FFF2-40B4-BE49-F238E27FC236}">
+                <a16:creationId xmlns:a16="http://schemas.microsoft.com/office/drawing/2014/main" id="{6350D5D5-8244-AABD-56A3-ABEA0DF50CA6}"/>
+              </a:ext>
+            </a:extLst>
+          </p:cNvPr>
+          <p:cNvPicPr>
+            <a:picLocks noGrp="1" noChangeAspect="1"/>
+          </p:cNvPicPr>
+          <p:nvPr>
+            <p:ph idx="1"/>
+          </p:nvPr>
+        </p:nvPicPr>
+        <p:blipFill rotWithShape="1">
+          <a:blip r:embed="rId2"/>
+          <a:srcRect t="-920" r="121" b="66258"/>
+          <a:stretch/>
+        </p:blipFill>
+        <p:spPr>
+          <a:xfrm>
+            <a:off x="206139" y="2300054"/>
+            <a:ext cx="7743953" cy="1063122"/>
+          </a:xfrm>
+        </p:spPr>
+      </p:pic>
+      <p:pic>
+        <p:nvPicPr>
+          <p:cNvPr id="7" name="Picture 7" descr="Graphical user interface, website&#10;&#10;Description automatically generated">
+            <a:extLst>
+              <a:ext uri="{FF2B5EF4-FFF2-40B4-BE49-F238E27FC236}">
+                <a16:creationId xmlns:a16="http://schemas.microsoft.com/office/drawing/2014/main" id="{C6253B62-AEE0-86D2-F26D-74B8A3CC574A}"/>
+              </a:ext>
+            </a:extLst>
+          </p:cNvPr>
+          <p:cNvPicPr>
+            <a:picLocks noChangeAspect="1"/>
+          </p:cNvPicPr>
+          <p:nvPr/>
+        </p:nvPicPr>
+        <p:blipFill>
+          <a:blip r:embed="rId3"/>
+          <a:stretch>
+            <a:fillRect/>
+          </a:stretch>
+        </p:blipFill>
+        <p:spPr>
+          <a:xfrm>
+            <a:off x="209550" y="3367747"/>
+            <a:ext cx="4876800" cy="3494356"/>
+          </a:xfrm>
+          <a:prstGeom prst="rect">
+            <a:avLst/>
+          </a:prstGeom>
+        </p:spPr>
+      </p:pic>
+      <p:pic>
+        <p:nvPicPr>
+          <p:cNvPr id="8" name="Picture 8" descr="Text&#10;&#10;Description automatically generated">
+            <a:extLst>
+              <a:ext uri="{FF2B5EF4-FFF2-40B4-BE49-F238E27FC236}">
+                <a16:creationId xmlns:a16="http://schemas.microsoft.com/office/drawing/2014/main" id="{49FD665F-8F54-9A1D-3A9D-470669A0C70F}"/>
+              </a:ext>
+            </a:extLst>
+          </p:cNvPr>
+          <p:cNvPicPr>
+            <a:picLocks noChangeAspect="1"/>
+          </p:cNvPicPr>
+          <p:nvPr/>
+        </p:nvPicPr>
+        <p:blipFill>
+          <a:blip r:embed="rId4"/>
+          <a:stretch>
+            <a:fillRect/>
+          </a:stretch>
+        </p:blipFill>
+        <p:spPr>
+          <a:xfrm>
+            <a:off x="5139055" y="3480388"/>
+            <a:ext cx="6929120" cy="1421224"/>
+          </a:xfrm>
+          <a:prstGeom prst="rect">
+            <a:avLst/>
+          </a:prstGeom>
+        </p:spPr>
+      </p:pic>
+    </p:spTree>
+    <p:extLst>
+      <p:ext uri="{BB962C8B-B14F-4D97-AF65-F5344CB8AC3E}">
+        <p14:creationId xmlns:p14="http://schemas.microsoft.com/office/powerpoint/2010/main" val="2601916464"/>
       </p:ext>
     </p:extLst>
   </p:cSld>
@@ -6463,7 +6625,7 @@
           <p:cNvPr id="2" name="Title 1">
             <a:extLst>
               <a:ext uri="{FF2B5EF4-FFF2-40B4-BE49-F238E27FC236}">
-                <a16:creationId xmlns:a16="http://schemas.microsoft.com/office/drawing/2014/main" id="{91388102-BA49-8DFE-99EC-5ED74B9ECD5C}"/>
+                <a16:creationId xmlns:a16="http://schemas.microsoft.com/office/drawing/2014/main" id="{64C087F3-9F42-3ABC-3AAB-B58CF92E19D2}"/>
               </a:ext>
             </a:extLst>
           </p:cNvPr>
@@ -6488,7 +6650,7 @@
           <a:p>
             <a:r>
               <a:rPr lang="en-US" dirty="0"/>
-              <a:t>Profile Page</a:t>
+              <a:t>Home Page</a:t>
             </a:r>
           </a:p>
         </p:txBody>
@@ -6498,7 +6660,7 @@
           <p:cNvPr id="8" name="Content Placeholder 7">
             <a:extLst>
               <a:ext uri="{FF2B5EF4-FFF2-40B4-BE49-F238E27FC236}">
-                <a16:creationId xmlns:a16="http://schemas.microsoft.com/office/drawing/2014/main" id="{571D2117-B436-84F4-AEE6-4A4894380DF1}"/>
+                <a16:creationId xmlns:a16="http://schemas.microsoft.com/office/drawing/2014/main" id="{1A026CDF-C9B7-2991-57CA-300D6CFD53D6}"/>
               </a:ext>
             </a:extLst>
           </p:cNvPr>
@@ -6527,10 +6689,10 @@
       </p:sp>
       <p:pic>
         <p:nvPicPr>
-          <p:cNvPr id="4" name="Picture 4" descr="Graphical user interface, application&#10;&#10;Description automatically generated">
+          <p:cNvPr id="4" name="Picture 4" descr="Graphical user interface&#10;&#10;Description automatically generated">
             <a:extLst>
               <a:ext uri="{FF2B5EF4-FFF2-40B4-BE49-F238E27FC236}">
-                <a16:creationId xmlns:a16="http://schemas.microsoft.com/office/drawing/2014/main" id="{CB745407-F74A-0E6F-1089-20439ECB970E}"/>
+                <a16:creationId xmlns:a16="http://schemas.microsoft.com/office/drawing/2014/main" id="{E85AC67F-CD89-5D4E-383A-04246A939387}"/>
               </a:ext>
             </a:extLst>
           </p:cNvPr>
@@ -6547,8 +6709,8 @@
         </p:blipFill>
         <p:spPr>
           <a:xfrm>
-            <a:off x="2556912" y="2099236"/>
-            <a:ext cx="7075369" cy="4646425"/>
+            <a:off x="2556913" y="2099235"/>
+            <a:ext cx="7075371" cy="4646426"/>
           </a:xfrm>
           <a:prstGeom prst="roundRect">
             <a:avLst>
@@ -6566,7 +6728,7 @@
     </p:spTree>
     <p:extLst>
       <p:ext uri="{BB962C8B-B14F-4D97-AF65-F5344CB8AC3E}">
-        <p14:creationId xmlns:p14="http://schemas.microsoft.com/office/powerpoint/2010/main" val="2601884900"/>
+        <p14:creationId xmlns:p14="http://schemas.microsoft.com/office/powerpoint/2010/main" val="2829471799"/>
       </p:ext>
     </p:extLst>
   </p:cSld>
@@ -6606,7 +6768,7 @@
           <p:cNvPr id="2" name="Title 1">
             <a:extLst>
               <a:ext uri="{FF2B5EF4-FFF2-40B4-BE49-F238E27FC236}">
-                <a16:creationId xmlns:a16="http://schemas.microsoft.com/office/drawing/2014/main" id="{DC9022A4-8E81-6AB7-915E-288D03D8FA8C}"/>
+                <a16:creationId xmlns:a16="http://schemas.microsoft.com/office/drawing/2014/main" id="{91388102-BA49-8DFE-99EC-5ED74B9ECD5C}"/>
               </a:ext>
             </a:extLst>
           </p:cNvPr>
@@ -6631,7 +6793,7 @@
           <a:p>
             <a:r>
               <a:rPr lang="en-US" dirty="0"/>
-              <a:t>QR Code Creation Page</a:t>
+              <a:t>Profile Page</a:t>
             </a:r>
           </a:p>
         </p:txBody>
@@ -6641,7 +6803,7 @@
           <p:cNvPr id="8" name="Content Placeholder 7">
             <a:extLst>
               <a:ext uri="{FF2B5EF4-FFF2-40B4-BE49-F238E27FC236}">
-                <a16:creationId xmlns:a16="http://schemas.microsoft.com/office/drawing/2014/main" id="{EF5315D6-E826-F419-CCA3-AD9FA4D641C9}"/>
+                <a16:creationId xmlns:a16="http://schemas.microsoft.com/office/drawing/2014/main" id="{571D2117-B436-84F4-AEE6-4A4894380DF1}"/>
               </a:ext>
             </a:extLst>
           </p:cNvPr>
@@ -6664,25 +6826,16 @@
           </a:bodyPr>
           <a:lstStyle/>
           <a:p>
-            <a:r>
-              <a:rPr lang="en-US" sz="1600" dirty="0"/>
-              <a:t>Add a link and provide a name</a:t>
-            </a:r>
-          </a:p>
-          <a:p>
-            <a:r>
-              <a:rPr lang="en-US" sz="1600" dirty="0"/>
-              <a:t>The description is optional</a:t>
-            </a:r>
+            <a:endParaRPr lang="en-US" sz="1600"/>
           </a:p>
         </p:txBody>
       </p:sp>
       <p:pic>
         <p:nvPicPr>
-          <p:cNvPr id="4" name="Picture 4" descr="Graphical user interface&#10;&#10;Description automatically generated">
+          <p:cNvPr id="4" name="Picture 4" descr="Graphical user interface, application&#10;&#10;Description automatically generated">
             <a:extLst>
               <a:ext uri="{FF2B5EF4-FFF2-40B4-BE49-F238E27FC236}">
-                <a16:creationId xmlns:a16="http://schemas.microsoft.com/office/drawing/2014/main" id="{5D37DD7A-400E-2CC4-B8F5-F1971A399468}"/>
+                <a16:creationId xmlns:a16="http://schemas.microsoft.com/office/drawing/2014/main" id="{CB745407-F74A-0E6F-1089-20439ECB970E}"/>
               </a:ext>
             </a:extLst>
           </p:cNvPr>
@@ -6699,8 +6852,8 @@
         </p:blipFill>
         <p:spPr>
           <a:xfrm>
-            <a:off x="4775678" y="1975971"/>
-            <a:ext cx="7321900" cy="4814514"/>
+            <a:off x="2556912" y="2099236"/>
+            <a:ext cx="7075369" cy="4646425"/>
           </a:xfrm>
           <a:prstGeom prst="roundRect">
             <a:avLst>
@@ -6718,7 +6871,7 @@
     </p:spTree>
     <p:extLst>
       <p:ext uri="{BB962C8B-B14F-4D97-AF65-F5344CB8AC3E}">
-        <p14:creationId xmlns:p14="http://schemas.microsoft.com/office/powerpoint/2010/main" val="1317602086"/>
+        <p14:creationId xmlns:p14="http://schemas.microsoft.com/office/powerpoint/2010/main" val="2601884900"/>
       </p:ext>
     </p:extLst>
   </p:cSld>
@@ -6758,6 +6911,158 @@
           <p:cNvPr id="2" name="Title 1">
             <a:extLst>
               <a:ext uri="{FF2B5EF4-FFF2-40B4-BE49-F238E27FC236}">
+                <a16:creationId xmlns:a16="http://schemas.microsoft.com/office/drawing/2014/main" id="{DC9022A4-8E81-6AB7-915E-288D03D8FA8C}"/>
+              </a:ext>
+            </a:extLst>
+          </p:cNvPr>
+          <p:cNvSpPr>
+            <a:spLocks noGrp="1"/>
+          </p:cNvSpPr>
+          <p:nvPr>
+            <p:ph type="title"/>
+          </p:nvPr>
+        </p:nvSpPr>
+        <p:spPr>
+          <a:xfrm>
+            <a:off x="810000" y="447188"/>
+            <a:ext cx="10571998" cy="970450"/>
+          </a:xfrm>
+        </p:spPr>
+        <p:txBody>
+          <a:bodyPr>
+            <a:normAutofit/>
+          </a:bodyPr>
+          <a:lstStyle/>
+          <a:p>
+            <a:r>
+              <a:rPr lang="en-US" dirty="0"/>
+              <a:t>QR Code Creation Page</a:t>
+            </a:r>
+          </a:p>
+        </p:txBody>
+      </p:sp>
+      <p:sp>
+        <p:nvSpPr>
+          <p:cNvPr id="8" name="Content Placeholder 7">
+            <a:extLst>
+              <a:ext uri="{FF2B5EF4-FFF2-40B4-BE49-F238E27FC236}">
+                <a16:creationId xmlns:a16="http://schemas.microsoft.com/office/drawing/2014/main" id="{EF5315D6-E826-F419-CCA3-AD9FA4D641C9}"/>
+              </a:ext>
+            </a:extLst>
+          </p:cNvPr>
+          <p:cNvSpPr>
+            <a:spLocks noGrp="1"/>
+          </p:cNvSpPr>
+          <p:nvPr>
+            <p:ph idx="1"/>
+          </p:nvPr>
+        </p:nvSpPr>
+        <p:spPr>
+          <a:xfrm>
+            <a:off x="818713" y="2413000"/>
+            <a:ext cx="3835583" cy="3632200"/>
+          </a:xfrm>
+        </p:spPr>
+        <p:txBody>
+          <a:bodyPr>
+            <a:normAutofit/>
+          </a:bodyPr>
+          <a:lstStyle/>
+          <a:p>
+            <a:r>
+              <a:rPr lang="en-US" sz="1600" dirty="0"/>
+              <a:t>Add a link and provide a name</a:t>
+            </a:r>
+          </a:p>
+          <a:p>
+            <a:r>
+              <a:rPr lang="en-US" sz="1600" dirty="0"/>
+              <a:t>The description is optional</a:t>
+            </a:r>
+          </a:p>
+        </p:txBody>
+      </p:sp>
+      <p:pic>
+        <p:nvPicPr>
+          <p:cNvPr id="4" name="Picture 4" descr="Graphical user interface&#10;&#10;Description automatically generated">
+            <a:extLst>
+              <a:ext uri="{FF2B5EF4-FFF2-40B4-BE49-F238E27FC236}">
+                <a16:creationId xmlns:a16="http://schemas.microsoft.com/office/drawing/2014/main" id="{5D37DD7A-400E-2CC4-B8F5-F1971A399468}"/>
+              </a:ext>
+            </a:extLst>
+          </p:cNvPr>
+          <p:cNvPicPr>
+            <a:picLocks noChangeAspect="1"/>
+          </p:cNvPicPr>
+          <p:nvPr/>
+        </p:nvPicPr>
+        <p:blipFill>
+          <a:blip r:embed="rId2"/>
+          <a:stretch>
+            <a:fillRect/>
+          </a:stretch>
+        </p:blipFill>
+        <p:spPr>
+          <a:xfrm>
+            <a:off x="4775678" y="1975971"/>
+            <a:ext cx="7321900" cy="4814514"/>
+          </a:xfrm>
+          <a:prstGeom prst="roundRect">
+            <a:avLst>
+              <a:gd name="adj" fmla="val 3876"/>
+            </a:avLst>
+          </a:prstGeom>
+          <a:ln>
+            <a:solidFill>
+              <a:schemeClr val="accent1"/>
+            </a:solidFill>
+          </a:ln>
+          <a:effectLst/>
+        </p:spPr>
+      </p:pic>
+    </p:spTree>
+    <p:extLst>
+      <p:ext uri="{BB962C8B-B14F-4D97-AF65-F5344CB8AC3E}">
+        <p14:creationId xmlns:p14="http://schemas.microsoft.com/office/powerpoint/2010/main" val="1317602086"/>
+      </p:ext>
+    </p:extLst>
+  </p:cSld>
+  <p:clrMapOvr>
+    <a:masterClrMapping/>
+  </p:clrMapOvr>
+</p:sld>
+</file>
+
+<file path=ppt/slides/slide9.xml><?xml version="1.0" encoding="utf-8"?>
+<p:sld xmlns:a="http://schemas.openxmlformats.org/drawingml/2006/main" xmlns:r="http://schemas.openxmlformats.org/officeDocument/2006/relationships" xmlns:p="http://schemas.openxmlformats.org/presentationml/2006/main">
+  <p:cSld>
+    <p:bg>
+      <p:bgPr>
+        <a:solidFill>
+          <a:schemeClr val="bg2"/>
+        </a:solidFill>
+        <a:effectLst/>
+      </p:bgPr>
+    </p:bg>
+    <p:spTree>
+      <p:nvGrpSpPr>
+        <p:cNvPr id="1" name=""/>
+        <p:cNvGrpSpPr/>
+        <p:nvPr/>
+      </p:nvGrpSpPr>
+      <p:grpSpPr>
+        <a:xfrm>
+          <a:off x="0" y="0"/>
+          <a:ext cx="0" cy="0"/>
+          <a:chOff x="0" y="0"/>
+          <a:chExt cx="0" cy="0"/>
+        </a:xfrm>
+      </p:grpSpPr>
+      <p:sp>
+        <p:nvSpPr>
+          <p:cNvPr id="2" name="Title 1">
+            <a:extLst>
+              <a:ext uri="{FF2B5EF4-FFF2-40B4-BE49-F238E27FC236}">
                 <a16:creationId xmlns:a16="http://schemas.microsoft.com/office/drawing/2014/main" id="{B66FA584-EB2F-EAC8-C0F4-553FF169E17B}"/>
               </a:ext>
             </a:extLst>
@@ -6886,118 +7191,6 @@
     <p:extLst>
       <p:ext uri="{BB962C8B-B14F-4D97-AF65-F5344CB8AC3E}">
         <p14:creationId xmlns:p14="http://schemas.microsoft.com/office/powerpoint/2010/main" val="2984445479"/>
-      </p:ext>
-    </p:extLst>
-  </p:cSld>
-  <p:clrMapOvr>
-    <a:masterClrMapping/>
-  </p:clrMapOvr>
-</p:sld>
-</file>
-
-<file path=ppt/slides/slide9.xml><?xml version="1.0" encoding="utf-8"?>
-<p:sld xmlns:a="http://schemas.openxmlformats.org/drawingml/2006/main" xmlns:r="http://schemas.openxmlformats.org/officeDocument/2006/relationships" xmlns:p="http://schemas.openxmlformats.org/presentationml/2006/main">
-  <p:cSld>
-    <p:spTree>
-      <p:nvGrpSpPr>
-        <p:cNvPr id="1" name=""/>
-        <p:cNvGrpSpPr/>
-        <p:nvPr/>
-      </p:nvGrpSpPr>
-      <p:grpSpPr>
-        <a:xfrm>
-          <a:off x="0" y="0"/>
-          <a:ext cx="0" cy="0"/>
-          <a:chOff x="0" y="0"/>
-          <a:chExt cx="0" cy="0"/>
-        </a:xfrm>
-      </p:grpSpPr>
-      <p:sp>
-        <p:nvSpPr>
-          <p:cNvPr id="2" name="Title 1">
-            <a:extLst>
-              <a:ext uri="{FF2B5EF4-FFF2-40B4-BE49-F238E27FC236}">
-                <a16:creationId xmlns:a16="http://schemas.microsoft.com/office/drawing/2014/main" id="{736F905B-E64A-D374-31D0-EB90047FFC68}"/>
-              </a:ext>
-            </a:extLst>
-          </p:cNvPr>
-          <p:cNvSpPr>
-            <a:spLocks noGrp="1"/>
-          </p:cNvSpPr>
-          <p:nvPr>
-            <p:ph type="title"/>
-          </p:nvPr>
-        </p:nvSpPr>
-        <p:spPr/>
-        <p:txBody>
-          <a:bodyPr/>
-          <a:lstStyle/>
-          <a:p>
-            <a:r>
-              <a:rPr lang="en-US"/>
-              <a:t>QR Validation Service</a:t>
-            </a:r>
-          </a:p>
-        </p:txBody>
-      </p:sp>
-      <p:sp>
-        <p:nvSpPr>
-          <p:cNvPr id="3" name="Content Placeholder 2">
-            <a:extLst>
-              <a:ext uri="{FF2B5EF4-FFF2-40B4-BE49-F238E27FC236}">
-                <a16:creationId xmlns:a16="http://schemas.microsoft.com/office/drawing/2014/main" id="{2A67D933-4638-371C-E1C5-9B9A5E6DB399}"/>
-              </a:ext>
-            </a:extLst>
-          </p:cNvPr>
-          <p:cNvSpPr>
-            <a:spLocks noGrp="1"/>
-          </p:cNvSpPr>
-          <p:nvPr>
-            <p:ph idx="1"/>
-          </p:nvPr>
-        </p:nvSpPr>
-        <p:spPr>
-          <a:xfrm>
-            <a:off x="808552" y="2222287"/>
-            <a:ext cx="4773534" cy="3636511"/>
-          </a:xfrm>
-        </p:spPr>
-        <p:txBody>
-          <a:bodyPr/>
-          <a:lstStyle/>
-          <a:p>
-            <a:r>
-              <a:rPr lang="en-US"/>
-              <a:t>Runs every 15 minutes </a:t>
-            </a:r>
-          </a:p>
-          <a:p>
-            <a:r>
-              <a:rPr lang="en-US"/>
-              <a:t>Check every QR link for broken endpoints and alerts the user to issues using the QR list.</a:t>
-            </a:r>
-          </a:p>
-          <a:p>
-            <a:r>
-              <a:rPr lang="en-US"/>
-              <a:t>User homepage keeps track of total broken links</a:t>
-            </a:r>
-          </a:p>
-          <a:p>
-            <a:pPr marL="0" indent="0">
-              <a:buNone/>
-            </a:pPr>
-            <a:endParaRPr lang="en-US"/>
-          </a:p>
-          <a:p>
-            <a:endParaRPr lang="en-US"/>
-          </a:p>
-        </p:txBody>
-      </p:sp>
-    </p:spTree>
-    <p:extLst>
-      <p:ext uri="{BB962C8B-B14F-4D97-AF65-F5344CB8AC3E}">
-        <p14:creationId xmlns:p14="http://schemas.microsoft.com/office/powerpoint/2010/main" val="3137855217"/>
       </p:ext>
     </p:extLst>
   </p:cSld>

</xml_diff>